<commit_message>
Update Project 1_Where to Build.pptx
</commit_message>
<xml_diff>
--- a/Project 1_Where to Build.pptx
+++ b/Project 1_Where to Build.pptx
@@ -225,7 +225,7 @@
           <a:effectLst/>
           <a:extLst>
             <a:ext uri="{91240B29-F687-4f45-9708-019B960494DF}">
-              <a14:hiddenLine xmlns="" xmlns:a14="http://schemas.microsoft.com/office/drawing/2010/main" w="9525">
+              <a14:hiddenLine xmlns:a14="http://schemas.microsoft.com/office/drawing/2010/main" xmlns="" w="9525">
                 <a:solidFill>
                   <a:srgbClr val="000000"/>
                 </a:solidFill>
@@ -1735,7 +1735,7 @@
           <a:ln/>
           <a:extLst>
             <a:ext uri="{91240B29-F687-4f45-9708-019B960494DF}">
-              <a14:hiddenLine xmlns="" xmlns:a14="http://schemas.microsoft.com/office/drawing/2010/main" w="9525">
+              <a14:hiddenLine xmlns:a14="http://schemas.microsoft.com/office/drawing/2010/main" xmlns="" w="9525">
                 <a:solidFill>
                   <a:srgbClr val="000000"/>
                 </a:solidFill>
@@ -2007,7 +2007,7 @@
           <a:ln/>
           <a:extLst>
             <a:ext uri="{91240B29-F687-4f45-9708-019B960494DF}">
-              <a14:hiddenLine xmlns="" xmlns:a14="http://schemas.microsoft.com/office/drawing/2010/main" w="9525">
+              <a14:hiddenLine xmlns:a14="http://schemas.microsoft.com/office/drawing/2010/main" xmlns="" w="9525">
                 <a:solidFill>
                   <a:srgbClr val="000000"/>
                 </a:solidFill>
@@ -2287,7 +2287,7 @@
           <a:ln/>
           <a:extLst>
             <a:ext uri="{91240B29-F687-4f45-9708-019B960494DF}">
-              <a14:hiddenLine xmlns="" xmlns:a14="http://schemas.microsoft.com/office/drawing/2010/main" w="9525">
+              <a14:hiddenLine xmlns:a14="http://schemas.microsoft.com/office/drawing/2010/main" xmlns="" w="9525">
                 <a:solidFill>
                   <a:srgbClr val="000000"/>
                 </a:solidFill>
@@ -2907,7 +2907,7 @@
           <a:ln/>
           <a:extLst>
             <a:ext uri="{91240B29-F687-4f45-9708-019B960494DF}">
-              <a14:hiddenLine xmlns="" xmlns:a14="http://schemas.microsoft.com/office/drawing/2010/main" w="9525">
+              <a14:hiddenLine xmlns:a14="http://schemas.microsoft.com/office/drawing/2010/main" xmlns="" w="9525">
                 <a:solidFill>
                   <a:srgbClr val="000000"/>
                 </a:solidFill>
@@ -3243,7 +3243,7 @@
           <a:ln/>
           <a:extLst>
             <a:ext uri="{91240B29-F687-4f45-9708-019B960494DF}">
-              <a14:hiddenLine xmlns="" xmlns:a14="http://schemas.microsoft.com/office/drawing/2010/main" w="9525">
+              <a14:hiddenLine xmlns:a14="http://schemas.microsoft.com/office/drawing/2010/main" xmlns="" w="9525">
                 <a:solidFill>
                   <a:srgbClr val="000000"/>
                 </a:solidFill>
@@ -3717,7 +3717,7 @@
           <a:ln/>
           <a:extLst>
             <a:ext uri="{91240B29-F687-4f45-9708-019B960494DF}">
-              <a14:hiddenLine xmlns="" xmlns:a14="http://schemas.microsoft.com/office/drawing/2010/main" w="9525">
+              <a14:hiddenLine xmlns:a14="http://schemas.microsoft.com/office/drawing/2010/main" xmlns="" w="9525">
                 <a:solidFill>
                   <a:srgbClr val="000000"/>
                 </a:solidFill>
@@ -4140,7 +4140,7 @@
           <a:ln/>
           <a:extLst>
             <a:ext uri="{91240B29-F687-4f45-9708-019B960494DF}">
-              <a14:hiddenLine xmlns="" xmlns:a14="http://schemas.microsoft.com/office/drawing/2010/main" w="9525">
+              <a14:hiddenLine xmlns:a14="http://schemas.microsoft.com/office/drawing/2010/main" xmlns="" w="9525">
                 <a:solidFill>
                   <a:srgbClr val="000000"/>
                 </a:solidFill>
@@ -5949,14 +5949,14 @@
             </a:br>
             <a:r>
               <a:rPr lang="en-US" sz="2800" dirty="0"/>
-              <a:t>Data Analysis: Bar chart Plot, </a:t>
+              <a:t>Data Analysis: Line chart, </a:t>
             </a:r>
             <a:br>
               <a:rPr lang="en-US" sz="2800" dirty="0"/>
             </a:br>
             <a:r>
               <a:rPr lang="en-US" sz="2800" dirty="0"/>
-              <a:t>Attractions: Location vs AVG Review Count</a:t>
+              <a:t>Hotel:  Cities vs AVG Price</a:t>
             </a:r>
             <a:endParaRPr lang="en-US" dirty="0"/>
           </a:p>
@@ -9492,6 +9492,18 @@
             <a:pPr lvl="1"/>
             <a:r>
               <a:rPr lang="en-US" dirty="0"/>
+              <a:t>Generated a line graph to determine total cost (hotel price vs city ) to determine which cities are </a:t>
+            </a:r>
+            <a:r>
+              <a:rPr lang="en-US"/>
+              <a:t>more expensive.</a:t>
+            </a:r>
+            <a:endParaRPr lang="en-US" dirty="0"/>
+          </a:p>
+          <a:p>
+            <a:pPr lvl="1"/>
+            <a:r>
+              <a:rPr lang="en-US" dirty="0"/>
               <a:t>Sub category East vs West Hotel Price Longitude </a:t>
             </a:r>
           </a:p>
@@ -9512,13 +9524,6 @@
             <a:r>
               <a:rPr lang="en-US" dirty="0"/>
               <a:t>Question three</a:t>
-            </a:r>
-          </a:p>
-          <a:p>
-            <a:pPr lvl="1"/>
-            <a:r>
-              <a:rPr lang="en-US" dirty="0"/>
-              <a:t>Generated a line graph to determine total cost (hotel and flights) to determine which cities are more expensive to travel to.</a:t>
             </a:r>
           </a:p>
           <a:p>

</xml_diff>